<commit_message>
Updating docs and validation
</commit_message>
<xml_diff>
--- a/docs/Final Presentation.pptx
+++ b/docs/Final Presentation.pptx
@@ -11,23 +11,24 @@
     <p:sldId id="259" r:id="rId5"/>
     <p:sldId id="260" r:id="rId6"/>
     <p:sldId id="261" r:id="rId7"/>
-    <p:sldId id="262" r:id="rId8"/>
-    <p:sldId id="265" r:id="rId9"/>
-    <p:sldId id="266" r:id="rId10"/>
-    <p:sldId id="267" r:id="rId11"/>
-    <p:sldId id="263" r:id="rId12"/>
-    <p:sldId id="264" r:id="rId13"/>
-    <p:sldId id="270" r:id="rId14"/>
-    <p:sldId id="271" r:id="rId15"/>
-    <p:sldId id="272" r:id="rId16"/>
-    <p:sldId id="273" r:id="rId17"/>
-    <p:sldId id="274" r:id="rId18"/>
-    <p:sldId id="275" r:id="rId19"/>
-    <p:sldId id="276" r:id="rId20"/>
-    <p:sldId id="277" r:id="rId21"/>
-    <p:sldId id="278" r:id="rId22"/>
-    <p:sldId id="279" r:id="rId23"/>
-    <p:sldId id="269" r:id="rId24"/>
+    <p:sldId id="280" r:id="rId8"/>
+    <p:sldId id="262" r:id="rId9"/>
+    <p:sldId id="265" r:id="rId10"/>
+    <p:sldId id="266" r:id="rId11"/>
+    <p:sldId id="267" r:id="rId12"/>
+    <p:sldId id="263" r:id="rId13"/>
+    <p:sldId id="264" r:id="rId14"/>
+    <p:sldId id="270" r:id="rId15"/>
+    <p:sldId id="271" r:id="rId16"/>
+    <p:sldId id="272" r:id="rId17"/>
+    <p:sldId id="273" r:id="rId18"/>
+    <p:sldId id="274" r:id="rId19"/>
+    <p:sldId id="275" r:id="rId20"/>
+    <p:sldId id="276" r:id="rId21"/>
+    <p:sldId id="277" r:id="rId22"/>
+    <p:sldId id="278" r:id="rId23"/>
+    <p:sldId id="279" r:id="rId24"/>
+    <p:sldId id="269" r:id="rId25"/>
   </p:sldIdLst>
   <p:sldSz cx="12192000" cy="6858000"/>
   <p:notesSz cx="6858000" cy="9144000"/>
@@ -140,6 +141,104 @@
     <p1510:client id="{0E691EF1-C185-4FE9-8BB6-A45BB7F60495}" v="179" dt="2018-04-27T11:55:52.571"/>
   </p1510:revLst>
 </p1510:revInfo>
+</file>
+
+<file path=ppt/changesInfos/changesInfo1.xml><?xml version="1.0" encoding="utf-8"?>
+<pc:chgInfo xmlns:a="http://schemas.openxmlformats.org/drawingml/2006/main" xmlns:r="http://schemas.openxmlformats.org/officeDocument/2006/relationships" xmlns:ac="http://schemas.microsoft.com/office/drawing/2013/main/command" xmlns:pc="http://schemas.microsoft.com/office/powerpoint/2013/main/command">
+  <pc:docChgLst>
+    <pc:chgData name="Raghavan Renganathan" userId="432f3cfc611c8b06" providerId="LiveId" clId="{38AA1A7A-EA46-4C55-B94C-367C5830FA31}"/>
+    <pc:docChg chg="undo custSel addSld modSld">
+      <pc:chgData name="Raghavan Renganathan" userId="432f3cfc611c8b06" providerId="LiveId" clId="{38AA1A7A-EA46-4C55-B94C-367C5830FA31}" dt="2018-04-27T20:03:14.891" v="315" actId="20577"/>
+      <pc:docMkLst>
+        <pc:docMk/>
+      </pc:docMkLst>
+      <pc:sldChg chg="modSp">
+        <pc:chgData name="Raghavan Renganathan" userId="432f3cfc611c8b06" providerId="LiveId" clId="{38AA1A7A-EA46-4C55-B94C-367C5830FA31}" dt="2018-04-27T20:00:12.686" v="175" actId="20577"/>
+        <pc:sldMkLst>
+          <pc:docMk/>
+          <pc:sldMk cId="2632462814" sldId="262"/>
+        </pc:sldMkLst>
+        <pc:spChg chg="mod">
+          <ac:chgData name="Raghavan Renganathan" userId="432f3cfc611c8b06" providerId="LiveId" clId="{38AA1A7A-EA46-4C55-B94C-367C5830FA31}" dt="2018-04-27T20:00:12.686" v="175" actId="20577"/>
+          <ac:spMkLst>
+            <pc:docMk/>
+            <pc:sldMk cId="2632462814" sldId="262"/>
+            <ac:spMk id="3" creationId="{84DFB09A-3B41-401E-8E0F-5E73365694DF}"/>
+          </ac:spMkLst>
+        </pc:spChg>
+      </pc:sldChg>
+      <pc:sldChg chg="modSp">
+        <pc:chgData name="Raghavan Renganathan" userId="432f3cfc611c8b06" providerId="LiveId" clId="{38AA1A7A-EA46-4C55-B94C-367C5830FA31}" dt="2018-04-27T20:03:14.891" v="315" actId="20577"/>
+        <pc:sldMkLst>
+          <pc:docMk/>
+          <pc:sldMk cId="2753342982" sldId="263"/>
+        </pc:sldMkLst>
+        <pc:spChg chg="mod">
+          <ac:chgData name="Raghavan Renganathan" userId="432f3cfc611c8b06" providerId="LiveId" clId="{38AA1A7A-EA46-4C55-B94C-367C5830FA31}" dt="2018-04-27T20:03:14.891" v="315" actId="20577"/>
+          <ac:spMkLst>
+            <pc:docMk/>
+            <pc:sldMk cId="2753342982" sldId="263"/>
+            <ac:spMk id="2" creationId="{ABAF0498-7A74-46DF-9D20-304865D07245}"/>
+          </ac:spMkLst>
+        </pc:spChg>
+        <pc:spChg chg="mod">
+          <ac:chgData name="Raghavan Renganathan" userId="432f3cfc611c8b06" providerId="LiveId" clId="{38AA1A7A-EA46-4C55-B94C-367C5830FA31}" dt="2018-04-27T20:03:01.170" v="281" actId="20577"/>
+          <ac:spMkLst>
+            <pc:docMk/>
+            <pc:sldMk cId="2753342982" sldId="263"/>
+            <ac:spMk id="3" creationId="{12A4C8E9-E343-4587-905D-BB25CB16C4F1}"/>
+          </ac:spMkLst>
+        </pc:spChg>
+      </pc:sldChg>
+      <pc:sldChg chg="modSp">
+        <pc:chgData name="Raghavan Renganathan" userId="432f3cfc611c8b06" providerId="LiveId" clId="{38AA1A7A-EA46-4C55-B94C-367C5830FA31}" dt="2018-04-27T19:58:31.260" v="53"/>
+        <pc:sldMkLst>
+          <pc:docMk/>
+          <pc:sldMk cId="1735568809" sldId="265"/>
+        </pc:sldMkLst>
+        <pc:spChg chg="mod">
+          <ac:chgData name="Raghavan Renganathan" userId="432f3cfc611c8b06" providerId="LiveId" clId="{38AA1A7A-EA46-4C55-B94C-367C5830FA31}" dt="2018-04-27T19:58:31.260" v="53"/>
+          <ac:spMkLst>
+            <pc:docMk/>
+            <pc:sldMk cId="1735568809" sldId="265"/>
+            <ac:spMk id="3" creationId="{FFE257DC-DBBA-4EF9-BC97-1C0486449871}"/>
+          </ac:spMkLst>
+        </pc:spChg>
+      </pc:sldChg>
+      <pc:sldChg chg="addSp delSp modSp add">
+        <pc:chgData name="Raghavan Renganathan" userId="432f3cfc611c8b06" providerId="LiveId" clId="{38AA1A7A-EA46-4C55-B94C-367C5830FA31}" dt="2018-04-27T20:02:07.507" v="191" actId="14100"/>
+        <pc:sldMkLst>
+          <pc:docMk/>
+          <pc:sldMk cId="701737728" sldId="280"/>
+        </pc:sldMkLst>
+        <pc:spChg chg="mod">
+          <ac:chgData name="Raghavan Renganathan" userId="432f3cfc611c8b06" providerId="LiveId" clId="{38AA1A7A-EA46-4C55-B94C-367C5830FA31}" dt="2018-04-27T20:00:25.557" v="186" actId="20577"/>
+          <ac:spMkLst>
+            <pc:docMk/>
+            <pc:sldMk cId="701737728" sldId="280"/>
+            <ac:spMk id="2" creationId="{1DA8B5C6-50ED-4F40-A80C-F3A0ED8A5E56}"/>
+          </ac:spMkLst>
+        </pc:spChg>
+        <pc:spChg chg="del">
+          <ac:chgData name="Raghavan Renganathan" userId="432f3cfc611c8b06" providerId="LiveId" clId="{38AA1A7A-EA46-4C55-B94C-367C5830FA31}" dt="2018-04-27T20:01:54.586" v="187"/>
+          <ac:spMkLst>
+            <pc:docMk/>
+            <pc:sldMk cId="701737728" sldId="280"/>
+            <ac:spMk id="3" creationId="{20FB65D6-596D-491E-8828-7CC5ADDEA0CD}"/>
+          </ac:spMkLst>
+        </pc:spChg>
+        <pc:picChg chg="add mod">
+          <ac:chgData name="Raghavan Renganathan" userId="432f3cfc611c8b06" providerId="LiveId" clId="{38AA1A7A-EA46-4C55-B94C-367C5830FA31}" dt="2018-04-27T20:02:07.507" v="191" actId="14100"/>
+          <ac:picMkLst>
+            <pc:docMk/>
+            <pc:sldMk cId="701737728" sldId="280"/>
+            <ac:picMk id="4" creationId="{1392EDF5-06CC-4358-AFF9-979089ABD791}"/>
+          </ac:picMkLst>
+        </pc:picChg>
+      </pc:sldChg>
+    </pc:docChg>
+  </pc:docChgLst>
+</pc:chgInfo>
 </file>
 
 <file path=ppt/slideLayouts/slideLayout1.xml><?xml version="1.0" encoding="utf-8"?>
@@ -6222,7 +6321,7 @@
           <p:cNvPr id="2" name="Title 1">
             <a:extLst>
               <a:ext uri="{FF2B5EF4-FFF2-40B4-BE49-F238E27FC236}">
-                <a16:creationId xmlns:a16="http://schemas.microsoft.com/office/drawing/2014/main" id="{413E2928-57F3-4D3B-B6B9-618EEACB9871}"/>
+                <a16:creationId xmlns:a16="http://schemas.microsoft.com/office/drawing/2014/main" id="{7F008C71-4E26-472E-9A47-B12DA0CD5DC9}"/>
               </a:ext>
             </a:extLst>
           </p:cNvPr>
@@ -6250,7 +6349,7 @@
           <p:cNvPr id="3" name="Content Placeholder 2">
             <a:extLst>
               <a:ext uri="{FF2B5EF4-FFF2-40B4-BE49-F238E27FC236}">
-                <a16:creationId xmlns:a16="http://schemas.microsoft.com/office/drawing/2014/main" id="{580AB3B6-43EC-4257-8A11-CFC3605A0EE1}"/>
+                <a16:creationId xmlns:a16="http://schemas.microsoft.com/office/drawing/2014/main" id="{756DB24B-D034-4554-AFED-F52A2C811ACE}"/>
               </a:ext>
             </a:extLst>
           </p:cNvPr>
@@ -6263,53 +6362,86 @@
         </p:nvSpPr>
         <p:spPr>
           <a:xfrm>
-            <a:off x="726239" y="1853248"/>
+            <a:off x="735667" y="1853248"/>
             <a:ext cx="8946541" cy="4195481"/>
           </a:xfrm>
         </p:spPr>
         <p:txBody>
-          <a:bodyPr/>
+          <a:bodyPr>
+            <a:normAutofit/>
+          </a:bodyPr>
           <a:lstStyle/>
           <a:p>
             <a:r>
               <a:rPr lang="en-US" sz="2100" dirty="0"/>
-              <a:t>Student :</a:t>
+              <a:t>Event Manager :</a:t>
             </a:r>
           </a:p>
           <a:p>
             <a:pPr lvl="1"/>
             <a:r>
               <a:rPr lang="en-US" sz="1900" dirty="0"/>
-              <a:t>Can register and participate in different events</a:t>
-            </a:r>
+              <a:t>Creates and manages events at different levels.</a:t>
+            </a:r>
+          </a:p>
+          <a:p>
+            <a:pPr lvl="1"/>
+            <a:r>
+              <a:rPr lang="en-US" sz="1900" dirty="0"/>
+              <a:t>Doesn’t need to get approval to create an event.</a:t>
+            </a:r>
+            <a:endParaRPr lang="en-US" dirty="0"/>
           </a:p>
           <a:p>
             <a:r>
               <a:rPr lang="en-US" sz="2100" dirty="0"/>
-              <a:t>Guest:</a:t>
+              <a:t>Faculty:</a:t>
             </a:r>
           </a:p>
           <a:p>
             <a:pPr lvl="1"/>
             <a:r>
               <a:rPr lang="en-US" sz="1900" dirty="0"/>
-              <a:t>Can register and participate in different events</a:t>
+              <a:t>Creates and manages events at different levels.</a:t>
             </a:r>
           </a:p>
           <a:p>
             <a:pPr lvl="1"/>
             <a:r>
               <a:rPr lang="en-US" sz="1900" dirty="0"/>
-              <a:t>Unlike Students, guests can only register for the events they are invited to</a:t>
+              <a:t>Needs to get approval to create an event.</a:t>
+            </a:r>
+          </a:p>
+          <a:p>
+            <a:r>
+              <a:rPr lang="en-US" sz="2100" dirty="0"/>
+              <a:t>Special Student :</a:t>
+            </a:r>
+          </a:p>
+          <a:p>
+            <a:pPr lvl="1"/>
+            <a:r>
+              <a:rPr lang="en-US" sz="1900" dirty="0"/>
+              <a:t>Creates and manages events at different levels.</a:t>
+            </a:r>
+          </a:p>
+          <a:p>
+            <a:pPr lvl="1"/>
+            <a:r>
+              <a:rPr lang="en-US" sz="1900" dirty="0"/>
+              <a:t>Can register and participate in different events.</a:t>
             </a:r>
           </a:p>
           <a:p>
             <a:pPr marL="457200" lvl="1" indent="0">
               <a:buNone/>
             </a:pPr>
-            <a:endParaRPr lang="en-US" sz="1900" dirty="0"/>
-          </a:p>
-          <a:p>
+            <a:endParaRPr lang="en-US" dirty="0"/>
+          </a:p>
+          <a:p>
+            <a:pPr marL="457200" lvl="1" indent="0">
+              <a:buNone/>
+            </a:pPr>
             <a:endParaRPr lang="en-US" dirty="0"/>
           </a:p>
         </p:txBody>
@@ -6317,7 +6449,7 @@
     </p:spTree>
     <p:extLst>
       <p:ext uri="{BB962C8B-B14F-4D97-AF65-F5344CB8AC3E}">
-        <p14:creationId xmlns:p14="http://schemas.microsoft.com/office/powerpoint/2010/main" val="2507157614"/>
+        <p14:creationId xmlns:p14="http://schemas.microsoft.com/office/powerpoint/2010/main" val="257680101"/>
       </p:ext>
     </p:extLst>
   </p:cSld>
@@ -6349,7 +6481,7 @@
           <p:cNvPr id="2" name="Title 1">
             <a:extLst>
               <a:ext uri="{FF2B5EF4-FFF2-40B4-BE49-F238E27FC236}">
-                <a16:creationId xmlns:a16="http://schemas.microsoft.com/office/drawing/2014/main" id="{ABAF0498-7A74-46DF-9D20-304865D07245}"/>
+                <a16:creationId xmlns:a16="http://schemas.microsoft.com/office/drawing/2014/main" id="{413E2928-57F3-4D3B-B6B9-618EEACB9871}"/>
               </a:ext>
             </a:extLst>
           </p:cNvPr>
@@ -6366,8 +6498,8 @@
           <a:lstStyle/>
           <a:p>
             <a:r>
-              <a:rPr lang="en-US" dirty="0"/>
-              <a:t>LEVELS:</a:t>
+              <a:rPr lang="en-US" sz="4000" dirty="0"/>
+              <a:t>ACTORS AND USECASES(contd.)</a:t>
             </a:r>
           </a:p>
         </p:txBody>
@@ -6377,7 +6509,7 @@
           <p:cNvPr id="3" name="Content Placeholder 2">
             <a:extLst>
               <a:ext uri="{FF2B5EF4-FFF2-40B4-BE49-F238E27FC236}">
-                <a16:creationId xmlns:a16="http://schemas.microsoft.com/office/drawing/2014/main" id="{12A4C8E9-E343-4587-905D-BB25CB16C4F1}"/>
+                <a16:creationId xmlns:a16="http://schemas.microsoft.com/office/drawing/2014/main" id="{580AB3B6-43EC-4257-8A11-CFC3605A0EE1}"/>
               </a:ext>
             </a:extLst>
           </p:cNvPr>
@@ -6390,7 +6522,7 @@
         </p:nvSpPr>
         <p:spPr>
           <a:xfrm>
-            <a:off x="745093" y="1694700"/>
+            <a:off x="726239" y="1853248"/>
             <a:ext cx="8946541" cy="4195481"/>
           </a:xfrm>
         </p:spPr>
@@ -6398,32 +6530,43 @@
           <a:bodyPr/>
           <a:lstStyle/>
           <a:p>
-            <a:pPr lvl="0"/>
-            <a:r>
-              <a:rPr lang="en-US" sz="2400" dirty="0"/>
-              <a:t>University</a:t>
-            </a:r>
-          </a:p>
-          <a:p>
-            <a:pPr lvl="0"/>
-            <a:r>
-              <a:rPr lang="en-US" sz="2400" dirty="0"/>
-              <a:t>College</a:t>
-            </a:r>
-          </a:p>
-          <a:p>
-            <a:pPr lvl="0"/>
-            <a:r>
-              <a:rPr lang="en-US" sz="2400" dirty="0"/>
-              <a:t>Department</a:t>
-            </a:r>
-          </a:p>
-          <a:p>
-            <a:pPr lvl="0"/>
-            <a:r>
-              <a:rPr lang="en-US" sz="2400" dirty="0"/>
-              <a:t>Groups (Clubs, etc.,)</a:t>
-            </a:r>
+            <a:r>
+              <a:rPr lang="en-US" sz="2100" dirty="0"/>
+              <a:t>Student :</a:t>
+            </a:r>
+          </a:p>
+          <a:p>
+            <a:pPr lvl="1"/>
+            <a:r>
+              <a:rPr lang="en-US" sz="1900" dirty="0"/>
+              <a:t>Can register and participate in different events</a:t>
+            </a:r>
+          </a:p>
+          <a:p>
+            <a:r>
+              <a:rPr lang="en-US" sz="2100" dirty="0"/>
+              <a:t>Guest:</a:t>
+            </a:r>
+          </a:p>
+          <a:p>
+            <a:pPr lvl="1"/>
+            <a:r>
+              <a:rPr lang="en-US" sz="1900" dirty="0"/>
+              <a:t>Can register and participate in different events</a:t>
+            </a:r>
+          </a:p>
+          <a:p>
+            <a:pPr lvl="1"/>
+            <a:r>
+              <a:rPr lang="en-US" sz="1900" dirty="0"/>
+              <a:t>Unlike Students, guests can only register for the events they are invited to</a:t>
+            </a:r>
+          </a:p>
+          <a:p>
+            <a:pPr marL="457200" lvl="1" indent="0">
+              <a:buNone/>
+            </a:pPr>
+            <a:endParaRPr lang="en-US" sz="1900" dirty="0"/>
           </a:p>
           <a:p>
             <a:endParaRPr lang="en-US" dirty="0"/>
@@ -6433,7 +6576,7 @@
     </p:spTree>
     <p:extLst>
       <p:ext uri="{BB962C8B-B14F-4D97-AF65-F5344CB8AC3E}">
-        <p14:creationId xmlns:p14="http://schemas.microsoft.com/office/powerpoint/2010/main" val="2753342982"/>
+        <p14:creationId xmlns:p14="http://schemas.microsoft.com/office/powerpoint/2010/main" val="2507157614"/>
       </p:ext>
     </p:extLst>
   </p:cSld>
@@ -6465,6 +6608,122 @@
           <p:cNvPr id="2" name="Title 1">
             <a:extLst>
               <a:ext uri="{FF2B5EF4-FFF2-40B4-BE49-F238E27FC236}">
+                <a16:creationId xmlns:a16="http://schemas.microsoft.com/office/drawing/2014/main" id="{ABAF0498-7A74-46DF-9D20-304865D07245}"/>
+              </a:ext>
+            </a:extLst>
+          </p:cNvPr>
+          <p:cNvSpPr>
+            <a:spLocks noGrp="1"/>
+          </p:cNvSpPr>
+          <p:nvPr>
+            <p:ph type="title"/>
+          </p:nvPr>
+        </p:nvSpPr>
+        <p:spPr/>
+        <p:txBody>
+          <a:bodyPr/>
+          <a:lstStyle/>
+          <a:p>
+            <a:r>
+              <a:rPr lang="en-US" dirty="0"/>
+              <a:t>Ecosystem Hierarchy:</a:t>
+            </a:r>
+          </a:p>
+        </p:txBody>
+      </p:sp>
+      <p:sp>
+        <p:nvSpPr>
+          <p:cNvPr id="3" name="Content Placeholder 2">
+            <a:extLst>
+              <a:ext uri="{FF2B5EF4-FFF2-40B4-BE49-F238E27FC236}">
+                <a16:creationId xmlns:a16="http://schemas.microsoft.com/office/drawing/2014/main" id="{12A4C8E9-E343-4587-905D-BB25CB16C4F1}"/>
+              </a:ext>
+            </a:extLst>
+          </p:cNvPr>
+          <p:cNvSpPr>
+            <a:spLocks noGrp="1"/>
+          </p:cNvSpPr>
+          <p:nvPr>
+            <p:ph idx="1"/>
+          </p:nvPr>
+        </p:nvSpPr>
+        <p:spPr>
+          <a:xfrm>
+            <a:off x="745093" y="1694700"/>
+            <a:ext cx="8946541" cy="4195481"/>
+          </a:xfrm>
+        </p:spPr>
+        <p:txBody>
+          <a:bodyPr/>
+          <a:lstStyle/>
+          <a:p>
+            <a:pPr lvl="0"/>
+            <a:r>
+              <a:rPr lang="en-US" sz="2400" dirty="0"/>
+              <a:t>University (Ecosystem)</a:t>
+            </a:r>
+          </a:p>
+          <a:p>
+            <a:pPr lvl="0"/>
+            <a:r>
+              <a:rPr lang="en-US" sz="2400" dirty="0"/>
+              <a:t>College (Network)</a:t>
+            </a:r>
+          </a:p>
+          <a:p>
+            <a:pPr lvl="0"/>
+            <a:r>
+              <a:rPr lang="en-US" sz="2400" dirty="0"/>
+              <a:t>Enterprises (Program, Administrative Wing, Councils)</a:t>
+            </a:r>
+          </a:p>
+          <a:p>
+            <a:pPr lvl="0"/>
+            <a:r>
+              <a:rPr lang="en-US" sz="2400" dirty="0"/>
+              <a:t>Organizations</a:t>
+            </a:r>
+          </a:p>
+          <a:p>
+            <a:endParaRPr lang="en-US" dirty="0"/>
+          </a:p>
+        </p:txBody>
+      </p:sp>
+    </p:spTree>
+    <p:extLst>
+      <p:ext uri="{BB962C8B-B14F-4D97-AF65-F5344CB8AC3E}">
+        <p14:creationId xmlns:p14="http://schemas.microsoft.com/office/powerpoint/2010/main" val="2753342982"/>
+      </p:ext>
+    </p:extLst>
+  </p:cSld>
+  <p:clrMapOvr>
+    <a:masterClrMapping/>
+  </p:clrMapOvr>
+</p:sld>
+</file>
+
+<file path=ppt/slides/slide13.xml><?xml version="1.0" encoding="utf-8"?>
+<p:sld xmlns:a="http://schemas.openxmlformats.org/drawingml/2006/main" xmlns:r="http://schemas.openxmlformats.org/officeDocument/2006/relationships" xmlns:p="http://schemas.openxmlformats.org/presentationml/2006/main">
+  <p:cSld>
+    <p:spTree>
+      <p:nvGrpSpPr>
+        <p:cNvPr id="1" name=""/>
+        <p:cNvGrpSpPr/>
+        <p:nvPr/>
+      </p:nvGrpSpPr>
+      <p:grpSpPr>
+        <a:xfrm>
+          <a:off x="0" y="0"/>
+          <a:ext cx="0" cy="0"/>
+          <a:chOff x="0" y="0"/>
+          <a:chExt cx="0" cy="0"/>
+        </a:xfrm>
+      </p:grpSpPr>
+      <p:sp>
+        <p:nvSpPr>
+          <p:cNvPr id="2" name="Title 1">
+            <a:extLst>
+              <a:ext uri="{FF2B5EF4-FFF2-40B4-BE49-F238E27FC236}">
                 <a16:creationId xmlns:a16="http://schemas.microsoft.com/office/drawing/2014/main" id="{67F1821B-CFCD-4313-B99F-12FC05F64ABC}"/>
               </a:ext>
             </a:extLst>
@@ -6564,7 +6823,7 @@
 </p:sld>
 </file>
 
-<file path=ppt/slides/slide13.xml><?xml version="1.0" encoding="utf-8"?>
+<file path=ppt/slides/slide14.xml><?xml version="1.0" encoding="utf-8"?>
 <p:sld xmlns:a="http://schemas.openxmlformats.org/drawingml/2006/main" xmlns:r="http://schemas.openxmlformats.org/officeDocument/2006/relationships" xmlns:p="http://schemas.openxmlformats.org/presentationml/2006/main">
   <p:cSld>
     <p:spTree>
@@ -6685,7 +6944,7 @@
 </p:sld>
 </file>
 
-<file path=ppt/slides/slide14.xml><?xml version="1.0" encoding="utf-8"?>
+<file path=ppt/slides/slide15.xml><?xml version="1.0" encoding="utf-8"?>
 <p:sld xmlns:a="http://schemas.openxmlformats.org/drawingml/2006/main" xmlns:r="http://schemas.openxmlformats.org/officeDocument/2006/relationships" xmlns:p="http://schemas.openxmlformats.org/presentationml/2006/main">
   <p:cSld>
     <p:spTree>
@@ -6806,7 +7065,7 @@
 </p:sld>
 </file>
 
-<file path=ppt/slides/slide15.xml><?xml version="1.0" encoding="utf-8"?>
+<file path=ppt/slides/slide16.xml><?xml version="1.0" encoding="utf-8"?>
 <p:sld xmlns:a="http://schemas.openxmlformats.org/drawingml/2006/main" xmlns:r="http://schemas.openxmlformats.org/officeDocument/2006/relationships" xmlns:p="http://schemas.openxmlformats.org/presentationml/2006/main">
   <p:cSld>
     <p:spTree>
@@ -6927,7 +7186,7 @@
 </p:sld>
 </file>
 
-<file path=ppt/slides/slide16.xml><?xml version="1.0" encoding="utf-8"?>
+<file path=ppt/slides/slide17.xml><?xml version="1.0" encoding="utf-8"?>
 <p:sld xmlns:a="http://schemas.openxmlformats.org/drawingml/2006/main" xmlns:r="http://schemas.openxmlformats.org/officeDocument/2006/relationships" xmlns:p="http://schemas.openxmlformats.org/presentationml/2006/main">
   <p:cSld>
     <p:spTree>
@@ -7048,7 +7307,7 @@
 </p:sld>
 </file>
 
-<file path=ppt/slides/slide17.xml><?xml version="1.0" encoding="utf-8"?>
+<file path=ppt/slides/slide18.xml><?xml version="1.0" encoding="utf-8"?>
 <p:sld xmlns:a="http://schemas.openxmlformats.org/drawingml/2006/main" xmlns:r="http://schemas.openxmlformats.org/officeDocument/2006/relationships" xmlns:p="http://schemas.openxmlformats.org/presentationml/2006/main">
   <p:cSld>
     <p:spTree>
@@ -7169,7 +7428,7 @@
 </p:sld>
 </file>
 
-<file path=ppt/slides/slide18.xml><?xml version="1.0" encoding="utf-8"?>
+<file path=ppt/slides/slide19.xml><?xml version="1.0" encoding="utf-8"?>
 <p:sld xmlns:a="http://schemas.openxmlformats.org/drawingml/2006/main" xmlns:r="http://schemas.openxmlformats.org/officeDocument/2006/relationships" xmlns:p="http://schemas.openxmlformats.org/presentationml/2006/main">
   <p:cSld>
     <p:spTree>
@@ -7290,7 +7549,104 @@
 </p:sld>
 </file>
 
-<file path=ppt/slides/slide19.xml><?xml version="1.0" encoding="utf-8"?>
+<file path=ppt/slides/slide2.xml><?xml version="1.0" encoding="utf-8"?>
+<p:sld xmlns:a="http://schemas.openxmlformats.org/drawingml/2006/main" xmlns:r="http://schemas.openxmlformats.org/officeDocument/2006/relationships" xmlns:p="http://schemas.openxmlformats.org/presentationml/2006/main">
+  <p:cSld>
+    <p:spTree>
+      <p:nvGrpSpPr>
+        <p:cNvPr id="1" name=""/>
+        <p:cNvGrpSpPr/>
+        <p:nvPr/>
+      </p:nvGrpSpPr>
+      <p:grpSpPr>
+        <a:xfrm>
+          <a:off x="0" y="0"/>
+          <a:ext cx="0" cy="0"/>
+          <a:chOff x="0" y="0"/>
+          <a:chExt cx="0" cy="0"/>
+        </a:xfrm>
+      </p:grpSpPr>
+      <p:sp>
+        <p:nvSpPr>
+          <p:cNvPr id="2" name="Title 1">
+            <a:extLst>
+              <a:ext uri="{FF2B5EF4-FFF2-40B4-BE49-F238E27FC236}">
+                <a16:creationId xmlns:a16="http://schemas.microsoft.com/office/drawing/2014/main" id="{D3F7B735-4CFB-4E0E-951A-555E9F3AB6AC}"/>
+              </a:ext>
+            </a:extLst>
+          </p:cNvPr>
+          <p:cNvSpPr>
+            <a:spLocks noGrp="1"/>
+          </p:cNvSpPr>
+          <p:nvPr>
+            <p:ph type="title"/>
+          </p:nvPr>
+        </p:nvSpPr>
+        <p:spPr/>
+        <p:txBody>
+          <a:bodyPr/>
+          <a:lstStyle/>
+          <a:p>
+            <a:r>
+              <a:rPr lang="en-US" sz="4000" dirty="0"/>
+              <a:t>ABSTRACT:</a:t>
+            </a:r>
+          </a:p>
+        </p:txBody>
+      </p:sp>
+      <p:sp>
+        <p:nvSpPr>
+          <p:cNvPr id="3" name="Content Placeholder 2">
+            <a:extLst>
+              <a:ext uri="{FF2B5EF4-FFF2-40B4-BE49-F238E27FC236}">
+                <a16:creationId xmlns:a16="http://schemas.microsoft.com/office/drawing/2014/main" id="{D496B378-597F-4598-B9AE-842AB3452443}"/>
+              </a:ext>
+            </a:extLst>
+          </p:cNvPr>
+          <p:cNvSpPr>
+            <a:spLocks noGrp="1"/>
+          </p:cNvSpPr>
+          <p:nvPr>
+            <p:ph idx="1"/>
+          </p:nvPr>
+        </p:nvSpPr>
+        <p:spPr/>
+        <p:txBody>
+          <a:bodyPr/>
+          <a:lstStyle/>
+          <a:p>
+            <a:pPr algn="just"/>
+            <a:r>
+              <a:rPr lang="en-US" sz="2400" dirty="0"/>
+              <a:t>Events are one of the great ways to meet new people, hear their stories, get to know each other. Also, events are where one could expand their knowledge, by getting to know great minds, share their experience and get inspired.</a:t>
+            </a:r>
+          </a:p>
+          <a:p>
+            <a:pPr algn="just"/>
+            <a:r>
+              <a:rPr lang="en-US" sz="2400" dirty="0"/>
+              <a:t>	Therefore, the top universities often conduct various events with various speakers to share their contribution in their domain of expertise with the students. That’s how new ideas are born, and legacies are formed.</a:t>
+            </a:r>
+          </a:p>
+          <a:p>
+            <a:endParaRPr lang="en-US" sz="2400" dirty="0"/>
+          </a:p>
+        </p:txBody>
+      </p:sp>
+    </p:spTree>
+    <p:extLst>
+      <p:ext uri="{BB962C8B-B14F-4D97-AF65-F5344CB8AC3E}">
+        <p14:creationId xmlns:p14="http://schemas.microsoft.com/office/powerpoint/2010/main" val="2619702355"/>
+      </p:ext>
+    </p:extLst>
+  </p:cSld>
+  <p:clrMapOvr>
+    <a:masterClrMapping/>
+  </p:clrMapOvr>
+</p:sld>
+</file>
+
+<file path=ppt/slides/slide20.xml><?xml version="1.0" encoding="utf-8"?>
 <p:sld xmlns:a="http://schemas.openxmlformats.org/drawingml/2006/main" xmlns:r="http://schemas.openxmlformats.org/officeDocument/2006/relationships" xmlns:p="http://schemas.openxmlformats.org/presentationml/2006/main">
   <p:cSld>
     <p:spTree>
@@ -7411,104 +7767,7 @@
 </p:sld>
 </file>
 
-<file path=ppt/slides/slide2.xml><?xml version="1.0" encoding="utf-8"?>
-<p:sld xmlns:a="http://schemas.openxmlformats.org/drawingml/2006/main" xmlns:r="http://schemas.openxmlformats.org/officeDocument/2006/relationships" xmlns:p="http://schemas.openxmlformats.org/presentationml/2006/main">
-  <p:cSld>
-    <p:spTree>
-      <p:nvGrpSpPr>
-        <p:cNvPr id="1" name=""/>
-        <p:cNvGrpSpPr/>
-        <p:nvPr/>
-      </p:nvGrpSpPr>
-      <p:grpSpPr>
-        <a:xfrm>
-          <a:off x="0" y="0"/>
-          <a:ext cx="0" cy="0"/>
-          <a:chOff x="0" y="0"/>
-          <a:chExt cx="0" cy="0"/>
-        </a:xfrm>
-      </p:grpSpPr>
-      <p:sp>
-        <p:nvSpPr>
-          <p:cNvPr id="2" name="Title 1">
-            <a:extLst>
-              <a:ext uri="{FF2B5EF4-FFF2-40B4-BE49-F238E27FC236}">
-                <a16:creationId xmlns:a16="http://schemas.microsoft.com/office/drawing/2014/main" id="{D3F7B735-4CFB-4E0E-951A-555E9F3AB6AC}"/>
-              </a:ext>
-            </a:extLst>
-          </p:cNvPr>
-          <p:cNvSpPr>
-            <a:spLocks noGrp="1"/>
-          </p:cNvSpPr>
-          <p:nvPr>
-            <p:ph type="title"/>
-          </p:nvPr>
-        </p:nvSpPr>
-        <p:spPr/>
-        <p:txBody>
-          <a:bodyPr/>
-          <a:lstStyle/>
-          <a:p>
-            <a:r>
-              <a:rPr lang="en-US" sz="4000" dirty="0"/>
-              <a:t>ABSTRACT:</a:t>
-            </a:r>
-          </a:p>
-        </p:txBody>
-      </p:sp>
-      <p:sp>
-        <p:nvSpPr>
-          <p:cNvPr id="3" name="Content Placeholder 2">
-            <a:extLst>
-              <a:ext uri="{FF2B5EF4-FFF2-40B4-BE49-F238E27FC236}">
-                <a16:creationId xmlns:a16="http://schemas.microsoft.com/office/drawing/2014/main" id="{D496B378-597F-4598-B9AE-842AB3452443}"/>
-              </a:ext>
-            </a:extLst>
-          </p:cNvPr>
-          <p:cNvSpPr>
-            <a:spLocks noGrp="1"/>
-          </p:cNvSpPr>
-          <p:nvPr>
-            <p:ph idx="1"/>
-          </p:nvPr>
-        </p:nvSpPr>
-        <p:spPr/>
-        <p:txBody>
-          <a:bodyPr/>
-          <a:lstStyle/>
-          <a:p>
-            <a:pPr algn="just"/>
-            <a:r>
-              <a:rPr lang="en-US" sz="2400" dirty="0"/>
-              <a:t>Events are one of the great ways to meet new people, hear their stories, get to know each other. Also, events are where one could expand their knowledge, by getting to know great minds, share their experience and get inspired.</a:t>
-            </a:r>
-          </a:p>
-          <a:p>
-            <a:pPr algn="just"/>
-            <a:r>
-              <a:rPr lang="en-US" sz="2400" dirty="0"/>
-              <a:t>	Therefore, the top universities often conduct various events with various speakers to share their contribution in their domain of expertise with the students. That’s how new ideas are born, and legacies are formed.</a:t>
-            </a:r>
-          </a:p>
-          <a:p>
-            <a:endParaRPr lang="en-US" sz="2400" dirty="0"/>
-          </a:p>
-        </p:txBody>
-      </p:sp>
-    </p:spTree>
-    <p:extLst>
-      <p:ext uri="{BB962C8B-B14F-4D97-AF65-F5344CB8AC3E}">
-        <p14:creationId xmlns:p14="http://schemas.microsoft.com/office/powerpoint/2010/main" val="2619702355"/>
-      </p:ext>
-    </p:extLst>
-  </p:cSld>
-  <p:clrMapOvr>
-    <a:masterClrMapping/>
-  </p:clrMapOvr>
-</p:sld>
-</file>
-
-<file path=ppt/slides/slide20.xml><?xml version="1.0" encoding="utf-8"?>
+<file path=ppt/slides/slide21.xml><?xml version="1.0" encoding="utf-8"?>
 <p:sld xmlns:a="http://schemas.openxmlformats.org/drawingml/2006/main" xmlns:r="http://schemas.openxmlformats.org/officeDocument/2006/relationships" xmlns:p="http://schemas.openxmlformats.org/presentationml/2006/main">
   <p:cSld>
     <p:spTree>
@@ -7629,7 +7888,7 @@
 </p:sld>
 </file>
 
-<file path=ppt/slides/slide21.xml><?xml version="1.0" encoding="utf-8"?>
+<file path=ppt/slides/slide22.xml><?xml version="1.0" encoding="utf-8"?>
 <p:sld xmlns:a="http://schemas.openxmlformats.org/drawingml/2006/main" xmlns:r="http://schemas.openxmlformats.org/officeDocument/2006/relationships" xmlns:p="http://schemas.openxmlformats.org/presentationml/2006/main">
   <p:cSld>
     <p:spTree>
@@ -7750,7 +8009,7 @@
 </p:sld>
 </file>
 
-<file path=ppt/slides/slide22.xml><?xml version="1.0" encoding="utf-8"?>
+<file path=ppt/slides/slide23.xml><?xml version="1.0" encoding="utf-8"?>
 <p:sld xmlns:a="http://schemas.openxmlformats.org/drawingml/2006/main" xmlns:r="http://schemas.openxmlformats.org/officeDocument/2006/relationships" xmlns:p="http://schemas.openxmlformats.org/presentationml/2006/main">
   <p:cSld>
     <p:spTree>
@@ -7871,7 +8130,7 @@
 </p:sld>
 </file>
 
-<file path=ppt/slides/slide23.xml><?xml version="1.0" encoding="utf-8"?>
+<file path=ppt/slides/slide24.xml><?xml version="1.0" encoding="utf-8"?>
 <p:sld xmlns:a="http://schemas.openxmlformats.org/drawingml/2006/main" xmlns:r="http://schemas.openxmlformats.org/officeDocument/2006/relationships" xmlns:p="http://schemas.openxmlformats.org/presentationml/2006/main">
   <p:cSld>
     <p:spTree>
@@ -8424,7 +8683,7 @@
           <p:cNvPr id="2" name="Title 1">
             <a:extLst>
               <a:ext uri="{FF2B5EF4-FFF2-40B4-BE49-F238E27FC236}">
-                <a16:creationId xmlns:a16="http://schemas.microsoft.com/office/drawing/2014/main" id="{77C16C0D-64DA-4A4A-A050-78A4A1E7A91C}"/>
+                <a16:creationId xmlns:a16="http://schemas.microsoft.com/office/drawing/2014/main" id="{1DA8B5C6-50ED-4F40-A80C-F3A0ED8A5E56}"/>
               </a:ext>
             </a:extLst>
           </p:cNvPr>
@@ -8441,96 +8700,49 @@
           <a:lstStyle/>
           <a:p>
             <a:r>
-              <a:rPr lang="en-US" sz="4000" dirty="0"/>
-              <a:t>ACTORS AND USECASES:</a:t>
-            </a:r>
-          </a:p>
-        </p:txBody>
-      </p:sp>
-      <p:sp>
-        <p:nvSpPr>
-          <p:cNvPr id="3" name="Content Placeholder 2">
+              <a:rPr lang="en-IN" dirty="0"/>
+              <a:t>ER Diagram</a:t>
+            </a:r>
+            <a:endParaRPr lang="en-US" dirty="0"/>
+          </a:p>
+        </p:txBody>
+      </p:sp>
+      <p:pic>
+        <p:nvPicPr>
+          <p:cNvPr id="4" name="Content Placeholder 3">
             <a:extLst>
               <a:ext uri="{FF2B5EF4-FFF2-40B4-BE49-F238E27FC236}">
-                <a16:creationId xmlns:a16="http://schemas.microsoft.com/office/drawing/2014/main" id="{84DFB09A-3B41-401E-8E0F-5E73365694DF}"/>
+                <a16:creationId xmlns:a16="http://schemas.microsoft.com/office/drawing/2014/main" id="{1392EDF5-06CC-4358-AFF9-979089ABD791}"/>
               </a:ext>
             </a:extLst>
           </p:cNvPr>
-          <p:cNvSpPr>
-            <a:spLocks noGrp="1"/>
-          </p:cNvSpPr>
+          <p:cNvPicPr>
+            <a:picLocks noGrp="1" noChangeAspect="1"/>
+          </p:cNvPicPr>
           <p:nvPr>
             <p:ph idx="1"/>
           </p:nvPr>
-        </p:nvSpPr>
+        </p:nvPicPr>
+        <p:blipFill>
+          <a:blip r:embed="rId2"/>
+          <a:stretch>
+            <a:fillRect/>
+          </a:stretch>
+        </p:blipFill>
         <p:spPr>
           <a:xfrm>
-            <a:off x="754520" y="1656993"/>
-            <a:ext cx="8946541" cy="4195481"/>
+            <a:off x="371476" y="1247774"/>
+            <a:ext cx="11420474" cy="5267325"/>
           </a:xfrm>
+          <a:prstGeom prst="rect">
+            <a:avLst/>
+          </a:prstGeom>
         </p:spPr>
-        <p:txBody>
-          <a:bodyPr>
-            <a:normAutofit/>
-          </a:bodyPr>
-          <a:lstStyle/>
-          <a:p>
-            <a:pPr lvl="0"/>
-            <a:r>
-              <a:rPr lang="en-US" sz="2100" dirty="0"/>
-              <a:t>Application Master : </a:t>
-            </a:r>
-          </a:p>
-          <a:p>
-            <a:pPr lvl="1"/>
-            <a:r>
-              <a:rPr lang="en-US" sz="1900" dirty="0"/>
-              <a:t>Creates and manages users at different levels</a:t>
-            </a:r>
-          </a:p>
-          <a:p>
-            <a:pPr lvl="1"/>
-            <a:r>
-              <a:rPr lang="en-US" sz="1900" dirty="0"/>
-              <a:t>Approves or rejects open event requests</a:t>
-            </a:r>
-          </a:p>
-          <a:p>
-            <a:pPr lvl="1"/>
-            <a:r>
-              <a:rPr lang="en-US" sz="1900" dirty="0"/>
-              <a:t>Views Event Statistics</a:t>
-            </a:r>
-          </a:p>
-          <a:p>
-            <a:pPr lvl="1"/>
-            <a:r>
-              <a:rPr lang="en-US" sz="1900" dirty="0"/>
-              <a:t>Creates and manages Colleges, programs, administrative wing and councils</a:t>
-            </a:r>
-          </a:p>
-          <a:p>
-            <a:pPr lvl="1"/>
-            <a:r>
-              <a:rPr lang="en-US" sz="1900" dirty="0"/>
-              <a:t>Creates events at various levels</a:t>
-            </a:r>
-          </a:p>
-          <a:p>
-            <a:pPr marL="0" indent="0">
-              <a:buNone/>
-            </a:pPr>
-            <a:r>
-              <a:rPr lang="en-US" dirty="0"/>
-              <a:t>	</a:t>
-            </a:r>
-          </a:p>
-        </p:txBody>
-      </p:sp>
+      </p:pic>
     </p:spTree>
     <p:extLst>
       <p:ext uri="{BB962C8B-B14F-4D97-AF65-F5344CB8AC3E}">
-        <p14:creationId xmlns:p14="http://schemas.microsoft.com/office/powerpoint/2010/main" val="2632462814"/>
+        <p14:creationId xmlns:p14="http://schemas.microsoft.com/office/powerpoint/2010/main" val="701737728"/>
       </p:ext>
     </p:extLst>
   </p:cSld>
@@ -8562,7 +8774,7 @@
           <p:cNvPr id="2" name="Title 1">
             <a:extLst>
               <a:ext uri="{FF2B5EF4-FFF2-40B4-BE49-F238E27FC236}">
-                <a16:creationId xmlns:a16="http://schemas.microsoft.com/office/drawing/2014/main" id="{B9C7CF17-F3BB-4F27-BE47-A657DD92BDFF}"/>
+                <a16:creationId xmlns:a16="http://schemas.microsoft.com/office/drawing/2014/main" id="{77C16C0D-64DA-4A4A-A050-78A4A1E7A91C}"/>
               </a:ext>
             </a:extLst>
           </p:cNvPr>
@@ -8580,7 +8792,7 @@
           <a:p>
             <a:r>
               <a:rPr lang="en-US" sz="4000" dirty="0"/>
-              <a:t>ACTORS AND USECASES(contd.)</a:t>
+              <a:t>ACTORS AND USECASES:</a:t>
             </a:r>
           </a:p>
         </p:txBody>
@@ -8590,7 +8802,7 @@
           <p:cNvPr id="3" name="Content Placeholder 2">
             <a:extLst>
               <a:ext uri="{FF2B5EF4-FFF2-40B4-BE49-F238E27FC236}">
-                <a16:creationId xmlns:a16="http://schemas.microsoft.com/office/drawing/2014/main" id="{FFE257DC-DBBA-4EF9-BC97-1C0486449871}"/>
+                <a16:creationId xmlns:a16="http://schemas.microsoft.com/office/drawing/2014/main" id="{84DFB09A-3B41-401E-8E0F-5E73365694DF}"/>
               </a:ext>
             </a:extLst>
           </p:cNvPr>
@@ -8603,100 +8815,98 @@
         </p:nvSpPr>
         <p:spPr>
           <a:xfrm>
-            <a:off x="735667" y="1779541"/>
+            <a:off x="754520" y="1656993"/>
             <a:ext cx="8946541" cy="4195481"/>
           </a:xfrm>
         </p:spPr>
         <p:txBody>
           <a:bodyPr>
-            <a:normAutofit lnSpcReduction="10000"/>
+            <a:normAutofit fontScale="92500" lnSpcReduction="20000"/>
           </a:bodyPr>
           <a:lstStyle/>
           <a:p>
             <a:pPr lvl="0"/>
             <a:r>
               <a:rPr lang="en-US" sz="2100" dirty="0"/>
-              <a:t>College Admin :</a:t>
+              <a:t>Application Master : </a:t>
             </a:r>
           </a:p>
           <a:p>
             <a:pPr lvl="1"/>
             <a:r>
+              <a:rPr lang="en-US" sz="1900" dirty="0"/>
+              <a:t>Creates and manages users at different levels</a:t>
+            </a:r>
+          </a:p>
+          <a:p>
+            <a:pPr lvl="1"/>
+            <a:r>
+              <a:rPr lang="en-US" sz="1900" dirty="0"/>
+              <a:t>Approves or rejects open event requests</a:t>
+            </a:r>
+          </a:p>
+          <a:p>
+            <a:pPr lvl="1"/>
+            <a:r>
+              <a:rPr lang="en-US" sz="1900" dirty="0"/>
+              <a:t>Views Event Statistics</a:t>
+            </a:r>
+          </a:p>
+          <a:p>
+            <a:pPr lvl="1"/>
+            <a:r>
+              <a:rPr lang="en-US" sz="1900" dirty="0"/>
+              <a:t>Creates and manages Colleges, programs, administrative wing and councils</a:t>
+            </a:r>
+          </a:p>
+          <a:p>
+            <a:pPr lvl="1"/>
+            <a:r>
+              <a:rPr lang="en-US" sz="1900" dirty="0"/>
+              <a:t>Creates events at various levels</a:t>
+            </a:r>
+          </a:p>
+          <a:p>
+            <a:pPr lvl="0"/>
+            <a:r>
               <a:rPr lang="en-US" dirty="0"/>
-              <a:t> </a:t>
-            </a:r>
+              <a:t>	</a:t>
+            </a:r>
+            <a:r>
+              <a:rPr lang="en-US" sz="2100" dirty="0"/>
+              <a:t>Network Admin: </a:t>
+            </a:r>
+          </a:p>
+          <a:p>
+            <a:pPr lvl="1"/>
             <a:r>
               <a:rPr lang="en-US" sz="1900" dirty="0"/>
-              <a:t>Creates and manages Programs, Administrative wing and Councils</a:t>
+              <a:t>Creates and manages users at network level</a:t>
             </a:r>
           </a:p>
           <a:p>
             <a:pPr lvl="1"/>
             <a:r>
               <a:rPr lang="en-US" sz="1900" dirty="0"/>
-              <a:t> Creates and manages users at college level</a:t>
+              <a:t>Approves or rejects network event requests</a:t>
             </a:r>
           </a:p>
           <a:p>
             <a:pPr lvl="1"/>
             <a:r>
               <a:rPr lang="en-US" sz="1900" dirty="0"/>
-              <a:t>Creates and manages events at college level</a:t>
+              <a:t>Creates and manages various entities in their network</a:t>
             </a:r>
           </a:p>
           <a:p>
             <a:pPr lvl="1"/>
             <a:r>
               <a:rPr lang="en-US" sz="1900" dirty="0"/>
-              <a:t>Approves or Rejects corresponding college level event requests and forwards other requests to the respective admins.  </a:t>
-            </a:r>
-          </a:p>
-          <a:p>
-            <a:pPr lvl="0"/>
-            <a:r>
-              <a:rPr lang="en-US" sz="2100" dirty="0"/>
-              <a:t>Program Admin :</a:t>
-            </a:r>
-          </a:p>
-          <a:p>
-            <a:pPr lvl="1"/>
-            <a:r>
-              <a:rPr lang="en-US" sz="1900" dirty="0"/>
-              <a:t>Creates and manages users at program level.</a:t>
-            </a:r>
-          </a:p>
-          <a:p>
-            <a:pPr lvl="1"/>
-            <a:r>
-              <a:rPr lang="en-US" sz="1900" dirty="0"/>
-              <a:t>Creates and manages events at program level.</a:t>
-            </a:r>
-          </a:p>
-          <a:p>
-            <a:pPr lvl="1"/>
-            <a:r>
-              <a:rPr lang="en-US" sz="1900" dirty="0"/>
-              <a:t>Approves or Rejects corresponding program level event requests and forwards other requests to the respective admins.  </a:t>
-            </a:r>
-          </a:p>
-          <a:p>
-            <a:pPr lvl="1"/>
-            <a:endParaRPr lang="en-US" dirty="0"/>
-          </a:p>
-          <a:p>
-            <a:pPr marL="457200" lvl="1" indent="0">
-              <a:buNone/>
-            </a:pPr>
-            <a:endParaRPr lang="en-US" dirty="0"/>
-          </a:p>
-          <a:p>
-            <a:pPr marL="457200" lvl="1" indent="0">
-              <a:buNone/>
-            </a:pPr>
-            <a:endParaRPr lang="en-US" dirty="0"/>
-          </a:p>
-          <a:p>
-            <a:pPr marL="457200" lvl="1" indent="0">
+              <a:t>Creates events at network level</a:t>
+            </a:r>
+          </a:p>
+          <a:p>
+            <a:pPr marL="0" indent="0">
               <a:buNone/>
             </a:pPr>
             <a:endParaRPr lang="en-US" dirty="0"/>
@@ -8706,7 +8916,7 @@
     </p:spTree>
     <p:extLst>
       <p:ext uri="{BB962C8B-B14F-4D97-AF65-F5344CB8AC3E}">
-        <p14:creationId xmlns:p14="http://schemas.microsoft.com/office/powerpoint/2010/main" val="1735568809"/>
+        <p14:creationId xmlns:p14="http://schemas.microsoft.com/office/powerpoint/2010/main" val="2632462814"/>
       </p:ext>
     </p:extLst>
   </p:cSld>
@@ -8738,7 +8948,7 @@
           <p:cNvPr id="2" name="Title 1">
             <a:extLst>
               <a:ext uri="{FF2B5EF4-FFF2-40B4-BE49-F238E27FC236}">
-                <a16:creationId xmlns:a16="http://schemas.microsoft.com/office/drawing/2014/main" id="{7F008C71-4E26-472E-9A47-B12DA0CD5DC9}"/>
+                <a16:creationId xmlns:a16="http://schemas.microsoft.com/office/drawing/2014/main" id="{B9C7CF17-F3BB-4F27-BE47-A657DD92BDFF}"/>
               </a:ext>
             </a:extLst>
           </p:cNvPr>
@@ -8766,7 +8976,7 @@
           <p:cNvPr id="3" name="Content Placeholder 2">
             <a:extLst>
               <a:ext uri="{FF2B5EF4-FFF2-40B4-BE49-F238E27FC236}">
-                <a16:creationId xmlns:a16="http://schemas.microsoft.com/office/drawing/2014/main" id="{756DB24B-D034-4554-AFED-F52A2C811ACE}"/>
+                <a16:creationId xmlns:a16="http://schemas.microsoft.com/office/drawing/2014/main" id="{FFE257DC-DBBA-4EF9-BC97-1C0486449871}"/>
               </a:ext>
             </a:extLst>
           </p:cNvPr>
@@ -8779,75 +8989,91 @@
         </p:nvSpPr>
         <p:spPr>
           <a:xfrm>
-            <a:off x="735667" y="1853248"/>
+            <a:off x="735667" y="1779541"/>
             <a:ext cx="8946541" cy="4195481"/>
           </a:xfrm>
         </p:spPr>
         <p:txBody>
           <a:bodyPr>
-            <a:normAutofit/>
+            <a:normAutofit lnSpcReduction="10000"/>
           </a:bodyPr>
           <a:lstStyle/>
           <a:p>
+            <a:pPr lvl="0"/>
             <a:r>
               <a:rPr lang="en-US" sz="2100" dirty="0"/>
-              <a:t>Event Manager :</a:t>
+              <a:t>Enterprise Admin :</a:t>
             </a:r>
           </a:p>
           <a:p>
             <a:pPr lvl="1"/>
             <a:r>
+              <a:rPr lang="en-US" dirty="0"/>
+              <a:t> </a:t>
+            </a:r>
+            <a:r>
               <a:rPr lang="en-US" sz="1900" dirty="0"/>
-              <a:t>Creates and manages events at different levels.</a:t>
+              <a:t>Creates and manages Programs, Administrative wing and Councils</a:t>
             </a:r>
           </a:p>
           <a:p>
             <a:pPr lvl="1"/>
             <a:r>
               <a:rPr lang="en-US" sz="1900" dirty="0"/>
-              <a:t>Doesn’t need to get approval to create an event.</a:t>
-            </a:r>
-            <a:endParaRPr lang="en-US" dirty="0"/>
-          </a:p>
-          <a:p>
+              <a:t> Creates and manages users at college level</a:t>
+            </a:r>
+          </a:p>
+          <a:p>
+            <a:pPr lvl="1"/>
+            <a:r>
+              <a:rPr lang="en-US" sz="1900" dirty="0"/>
+              <a:t>Creates and manages events at college level</a:t>
+            </a:r>
+          </a:p>
+          <a:p>
+            <a:pPr lvl="1"/>
+            <a:r>
+              <a:rPr lang="en-US" sz="1900" dirty="0"/>
+              <a:t>Approves or Rejects corresponding college level event requests and forwards other requests to the respective admins.  </a:t>
+            </a:r>
+          </a:p>
+          <a:p>
+            <a:pPr lvl="0"/>
             <a:r>
               <a:rPr lang="en-US" sz="2100" dirty="0"/>
-              <a:t>Faculty:</a:t>
+              <a:t>Organization Admin :</a:t>
             </a:r>
           </a:p>
           <a:p>
             <a:pPr lvl="1"/>
             <a:r>
               <a:rPr lang="en-US" sz="1900" dirty="0"/>
-              <a:t>Creates and manages events at different levels.</a:t>
+              <a:t>Creates and manages users at organization level.</a:t>
             </a:r>
           </a:p>
           <a:p>
             <a:pPr lvl="1"/>
             <a:r>
               <a:rPr lang="en-US" sz="1900" dirty="0"/>
-              <a:t>Needs to get approval to create an event.</a:t>
-            </a:r>
-          </a:p>
-          <a:p>
-            <a:r>
-              <a:rPr lang="en-US" sz="2100" dirty="0"/>
-              <a:t>Special Student :</a:t>
+              <a:t>Creates and manages events at organization level.</a:t>
             </a:r>
           </a:p>
           <a:p>
             <a:pPr lvl="1"/>
             <a:r>
               <a:rPr lang="en-US" sz="1900" dirty="0"/>
-              <a:t>Creates and manages events at different levels.</a:t>
+              <a:t>Approves or Rejects corresponding organization level event requests and forwards other requests to the respective admins.  </a:t>
             </a:r>
           </a:p>
           <a:p>
             <a:pPr lvl="1"/>
-            <a:r>
-              <a:rPr lang="en-US" sz="1900" dirty="0"/>
-              <a:t>Can register and participate in different events.</a:t>
-            </a:r>
+            <a:endParaRPr lang="en-US" dirty="0"/>
+          </a:p>
+          <a:p>
+            <a:pPr marL="457200" lvl="1" indent="0">
+              <a:buNone/>
+            </a:pPr>
+            <a:endParaRPr lang="en-US" dirty="0"/>
           </a:p>
           <a:p>
             <a:pPr marL="457200" lvl="1" indent="0">
@@ -8866,7 +9092,7 @@
     </p:spTree>
     <p:extLst>
       <p:ext uri="{BB962C8B-B14F-4D97-AF65-F5344CB8AC3E}">
-        <p14:creationId xmlns:p14="http://schemas.microsoft.com/office/powerpoint/2010/main" val="257680101"/>
+        <p14:creationId xmlns:p14="http://schemas.microsoft.com/office/powerpoint/2010/main" val="1735568809"/>
       </p:ext>
     </p:extLst>
   </p:cSld>

</xml_diff>